<commit_message>
Updated slides abt Bayesian
</commit_message>
<xml_diff>
--- a/222_presentation.pptx
+++ b/222_presentation.pptx
@@ -135,10 +135,6 @@
     </p:extLst>
   </p:cmAuthor>
 </p:cmAuthorLst>
-</file>
-
-<file path=ppt/revisionInfo.xml><?xml version="1.0" encoding="utf-8"?>
-<p1510:revInfo xmlns:a="http://schemas.openxmlformats.org/drawingml/2006/main" xmlns:r="http://schemas.openxmlformats.org/officeDocument/2006/relationships" xmlns:p1510="http://schemas.microsoft.com/office/powerpoint/2015/10/main"/>
 </file>
 
 <file path=ppt/comments/comment1.xml><?xml version="1.0" encoding="utf-8"?>
@@ -3995,55 +3991,6 @@
       </p:sp>
       <p:pic>
         <p:nvPicPr>
-          <p:cNvPr id="1026" name="Picture 2" descr="https://lh4.googleusercontent.com/_v9yMjqzJJXTcAPaijwGw3yAnezQCCU_Z2hjW8W1M4MCwpOTEJiIRUiyeKzBwqNIL2nQyd768_Gy0Adu8oOtg2GHH2YmZzFrH0i0vIzPqIqXOQ8HVvIUiSjF1uL4dfbKNFqqA5vxIZg">
-            <a:extLst>
-              <a:ext uri="{FF2B5EF4-FFF2-40B4-BE49-F238E27FC236}">
-                <a16:creationId xmlns:a16="http://schemas.microsoft.com/office/drawing/2014/main" id="{267E4F48-D8E1-4E4D-AE9E-4F052C617198}"/>
-              </a:ext>
-            </a:extLst>
-          </p:cNvPr>
-          <p:cNvPicPr>
-            <a:picLocks noGrp="1" noChangeAspect="1" noChangeArrowheads="1"/>
-          </p:cNvPicPr>
-          <p:nvPr>
-            <p:ph idx="1"/>
-          </p:nvPr>
-        </p:nvPicPr>
-        <p:blipFill>
-          <a:blip r:embed="rId2">
-            <a:extLst>
-              <a:ext uri="{28A0092B-C50C-407E-A947-70E740481C1C}">
-                <a14:useLocalDpi xmlns:a14="http://schemas.microsoft.com/office/drawing/2010/main" val="0"/>
-              </a:ext>
-            </a:extLst>
-          </a:blip>
-          <a:srcRect/>
-          <a:stretch>
-            <a:fillRect/>
-          </a:stretch>
-        </p:blipFill>
-        <p:spPr bwMode="auto">
-          <a:xfrm>
-            <a:off x="460754" y="1951037"/>
-            <a:ext cx="5762967" cy="3240087"/>
-          </a:xfrm>
-          <a:prstGeom prst="rect">
-            <a:avLst/>
-          </a:prstGeom>
-          <a:noFill/>
-          <a:extLst>
-            <a:ext uri="{909E8E84-426E-40DD-AFC4-6F175D3DCCD1}">
-              <a14:hiddenFill xmlns:a14="http://schemas.microsoft.com/office/drawing/2010/main">
-                <a:solidFill>
-                  <a:srgbClr val="FFFFFF"/>
-                </a:solidFill>
-              </a14:hiddenFill>
-            </a:ext>
-          </a:extLst>
-        </p:spPr>
-      </p:pic>
-      <p:pic>
-        <p:nvPicPr>
           <p:cNvPr id="4" name="Picture 3">
             <a:extLst>
               <a:ext uri="{FF2B5EF4-FFF2-40B4-BE49-F238E27FC236}">
@@ -4057,7 +4004,7 @@
           <p:nvPr/>
         </p:nvPicPr>
         <p:blipFill>
-          <a:blip r:embed="rId3"/>
+          <a:blip r:embed="rId2"/>
           <a:stretch>
             <a:fillRect/>
           </a:stretch>
@@ -4087,7 +4034,7 @@
           <p:nvPr/>
         </p:nvPicPr>
         <p:blipFill>
-          <a:blip r:embed="rId4">
+          <a:blip r:embed="rId3">
             <a:extLst>
               <a:ext uri="{28A0092B-C50C-407E-A947-70E740481C1C}">
                 <a14:useLocalDpi xmlns:a14="http://schemas.microsoft.com/office/drawing/2010/main" val="0"/>
@@ -4103,6 +4050,51 @@
           <a:xfrm>
             <a:off x="5766548" y="2243137"/>
             <a:ext cx="5748119" cy="2903537"/>
+          </a:xfrm>
+          <a:prstGeom prst="rect">
+            <a:avLst/>
+          </a:prstGeom>
+          <a:noFill/>
+          <a:extLst>
+            <a:ext uri="{909E8E84-426E-40DD-AFC4-6F175D3DCCD1}">
+              <a14:hiddenFill xmlns:a14="http://schemas.microsoft.com/office/drawing/2010/main">
+                <a:solidFill>
+                  <a:srgbClr val="FFFFFF"/>
+                </a:solidFill>
+              </a14:hiddenFill>
+            </a:ext>
+          </a:extLst>
+        </p:spPr>
+      </p:pic>
+      <p:pic>
+        <p:nvPicPr>
+          <p:cNvPr id="1030" name="Picture 6" descr="https://lh6.googleusercontent.com/uFlvHS6wMNYquZqD1big9oD2k0SbrlX7XrTCo-nb99hq9fNOrLmLq_tykCRGkEhqEwWmAhjf-RG4xKKl-5M5S1vAbq5MisITgwBYCQT1VfR555kwJWuoXaGAe4Ps3CuXIyj4">
+            <a:extLst>
+              <a:ext uri="{FF2B5EF4-FFF2-40B4-BE49-F238E27FC236}">
+                <a16:creationId xmlns:a16="http://schemas.microsoft.com/office/drawing/2014/main" id="{EC951D39-206C-45CA-ACCD-8C0F9A0B6AA1}"/>
+              </a:ext>
+            </a:extLst>
+          </p:cNvPr>
+          <p:cNvPicPr>
+            <a:picLocks noChangeAspect="1" noChangeArrowheads="1"/>
+          </p:cNvPicPr>
+          <p:nvPr/>
+        </p:nvPicPr>
+        <p:blipFill rotWithShape="1">
+          <a:blip r:embed="rId4">
+            <a:extLst>
+              <a:ext uri="{28A0092B-C50C-407E-A947-70E740481C1C}">
+                <a14:useLocalDpi xmlns:a14="http://schemas.microsoft.com/office/drawing/2010/main" val="0"/>
+              </a:ext>
+            </a:extLst>
+          </a:blip>
+          <a:srcRect l="25269" t="67045" r="40346" b="13687"/>
+          <a:stretch/>
+        </p:blipFill>
+        <p:spPr bwMode="auto">
+          <a:xfrm>
+            <a:off x="1125855" y="3056730"/>
+            <a:ext cx="4192172" cy="1320800"/>
           </a:xfrm>
           <a:prstGeom prst="rect">
             <a:avLst/>
@@ -4834,7 +4826,7 @@
             <a:pPr lvl="1" fontAlgn="base"/>
             <a:r>
               <a:rPr lang="en-US" sz="2800" dirty="0"/>
-              <a:t>Jeffrey’s estimate (Bayesian)</a:t>
+              <a:t>Exponential-Gamma Estimator with Jeffrey’s Prior</a:t>
             </a:r>
           </a:p>
           <a:p>
@@ -6486,8 +6478,8 @@
           <a:chExt cx="0" cy="0"/>
         </a:xfrm>
       </p:grpSpPr>
-      <mc:AlternateContent xmlns:mc="http://schemas.openxmlformats.org/markup-compatibility/2006" xmlns:a14="http://schemas.microsoft.com/office/drawing/2010/main">
-        <mc:Choice Requires="a14">
+      <mc:AlternateContent xmlns:mc="http://schemas.openxmlformats.org/markup-compatibility/2006">
+        <mc:Choice xmlns:a14="http://schemas.microsoft.com/office/drawing/2010/main" Requires="a14">
           <p:sp>
             <p:nvSpPr>
               <p:cNvPr id="3" name="Content Placeholder 2">
@@ -6811,7 +6803,7 @@
                             <m:t>α</m:t>
                           </m:r>
                           <m:r>
-                            <a:rPr lang="en-US" sz="3200" i="1" baseline="30000">
+                            <a:rPr lang="en-US" sz="3200" b="0" i="0" baseline="30000" smtClean="0">
                               <a:latin typeface="Cambria Math" panose="02040503050406030204" pitchFamily="18" charset="0"/>
                             </a:rPr>
                             <m:t>−</m:t>
@@ -7046,7 +7038,7 @@
             </p:txBody>
           </p:sp>
         </mc:Choice>
-        <mc:Fallback xmlns="">
+        <mc:Fallback>
           <p:sp>
             <p:nvSpPr>
               <p:cNvPr id="3" name="Content Placeholder 2">
@@ -7169,13 +7161,13 @@
           <a:p>
             <a:r>
               <a:rPr lang="en-US" dirty="0"/>
-              <a:t>Jeffrey’s Equal-Tailed Interval</a:t>
+              <a:t>Jeffrey’s Prior Bayesian Estimate</a:t>
             </a:r>
           </a:p>
         </p:txBody>
       </p:sp>
-      <mc:AlternateContent xmlns:mc="http://schemas.openxmlformats.org/markup-compatibility/2006" xmlns:a14="http://schemas.microsoft.com/office/drawing/2010/main">
-        <mc:Choice Requires="a14">
+      <mc:AlternateContent xmlns:mc="http://schemas.openxmlformats.org/markup-compatibility/2006">
+        <mc:Choice xmlns:a14="http://schemas.microsoft.com/office/drawing/2010/main" Requires="a14">
           <p:sp>
             <p:nvSpPr>
               <p:cNvPr id="7" name="Content Placeholder 2">
@@ -7438,97 +7430,97 @@
                     </m:oMathParaPr>
                     <m:oMath xmlns:m="http://schemas.openxmlformats.org/officeDocument/2006/math">
                       <m:r>
-                        <a:rPr lang="en-US" sz="3200" i="1">
+                        <a:rPr lang="en-US" sz="3200" i="1" smtClean="0">
                           <a:latin typeface="Cambria Math" panose="02040503050406030204" pitchFamily="18" charset="0"/>
                         </a:rPr>
                         <m:t>𝑝</m:t>
                       </m:r>
                       <m:r>
-                        <a:rPr lang="en-US" sz="3200" i="1">
+                        <a:rPr lang="en-US" sz="3200" i="1" smtClean="0">
                           <a:latin typeface="Cambria Math" panose="02040503050406030204" pitchFamily="18" charset="0"/>
                         </a:rPr>
                         <m:t>(</m:t>
                       </m:r>
                       <m:r>
-                        <a:rPr lang="en-US" sz="3200" i="1">
+                        <a:rPr lang="en-US" sz="3200" i="1" smtClean="0">
                           <a:latin typeface="Cambria Math" panose="02040503050406030204" pitchFamily="18" charset="0"/>
                         </a:rPr>
                         <m:t>𝜃</m:t>
                       </m:r>
                       <m:r>
-                        <a:rPr lang="en-US" sz="3200" i="1">
+                        <a:rPr lang="en-US" sz="3200" i="1" smtClean="0">
                           <a:latin typeface="Cambria Math" panose="02040503050406030204" pitchFamily="18" charset="0"/>
                         </a:rPr>
                         <m:t>|</m:t>
                       </m:r>
                       <m:r>
-                        <a:rPr lang="en-US" sz="3200" i="1">
+                        <a:rPr lang="en-US" sz="3200" i="1" smtClean="0">
                           <a:latin typeface="Cambria Math" panose="02040503050406030204" pitchFamily="18" charset="0"/>
                         </a:rPr>
                         <m:t>𝑥</m:t>
                       </m:r>
                       <m:r>
-                        <a:rPr lang="en-US" sz="3200" i="1">
+                        <a:rPr lang="en-US" sz="3200" i="1" smtClean="0">
                           <a:latin typeface="Cambria Math" panose="02040503050406030204" pitchFamily="18" charset="0"/>
                         </a:rPr>
                         <m:t>) ∝ </m:t>
                       </m:r>
                       <m:r>
-                        <a:rPr lang="en-US" sz="3200" i="1">
+                        <a:rPr lang="en-US" sz="3200" i="1" smtClean="0">
                           <a:latin typeface="Cambria Math" panose="02040503050406030204" pitchFamily="18" charset="0"/>
                         </a:rPr>
                         <m:t>𝑝</m:t>
                       </m:r>
                       <m:r>
-                        <a:rPr lang="en-US" sz="3200" i="1">
+                        <a:rPr lang="en-US" sz="3200" i="1" smtClean="0">
                           <a:latin typeface="Cambria Math" panose="02040503050406030204" pitchFamily="18" charset="0"/>
                         </a:rPr>
                         <m:t>(</m:t>
                       </m:r>
                       <m:r>
-                        <a:rPr lang="en-US" sz="3200" i="1">
+                        <a:rPr lang="en-US" sz="3200" i="1" smtClean="0">
                           <a:latin typeface="Cambria Math" panose="02040503050406030204" pitchFamily="18" charset="0"/>
                         </a:rPr>
                         <m:t>𝜃</m:t>
                       </m:r>
                       <m:r>
-                        <a:rPr lang="en-US" sz="3200" i="1">
+                        <a:rPr lang="en-US" sz="3200" i="1" smtClean="0">
                           <a:latin typeface="Cambria Math" panose="02040503050406030204" pitchFamily="18" charset="0"/>
                         </a:rPr>
                         <m:t>)</m:t>
                       </m:r>
                       <m:r>
-                        <a:rPr lang="en-US" sz="3200" i="1">
+                        <a:rPr lang="en-US" sz="3200" i="1" smtClean="0">
                           <a:latin typeface="Cambria Math" panose="02040503050406030204" pitchFamily="18" charset="0"/>
                         </a:rPr>
                         <m:t>𝐿</m:t>
                       </m:r>
                       <m:r>
-                        <a:rPr lang="en-US" sz="3200" i="1">
+                        <a:rPr lang="en-US" sz="3200" i="1" smtClean="0">
                           <a:latin typeface="Cambria Math" panose="02040503050406030204" pitchFamily="18" charset="0"/>
                         </a:rPr>
                         <m:t>(</m:t>
                       </m:r>
                       <m:r>
-                        <a:rPr lang="en-US" sz="3200" i="1">
+                        <a:rPr lang="en-US" sz="3200" i="1" smtClean="0">
                           <a:latin typeface="Cambria Math" panose="02040503050406030204" pitchFamily="18" charset="0"/>
                         </a:rPr>
                         <m:t>𝜃</m:t>
                       </m:r>
                       <m:r>
-                        <a:rPr lang="en-US" sz="3200" i="1">
+                        <a:rPr lang="en-US" sz="3200" i="1" smtClean="0">
                           <a:latin typeface="Cambria Math" panose="02040503050406030204" pitchFamily="18" charset="0"/>
                         </a:rPr>
                         <m:t>|</m:t>
                       </m:r>
                       <m:r>
-                        <a:rPr lang="en-US" sz="3200" i="1">
+                        <a:rPr lang="en-US" sz="3200" i="1" smtClean="0">
                           <a:latin typeface="Cambria Math" panose="02040503050406030204" pitchFamily="18" charset="0"/>
                         </a:rPr>
                         <m:t>𝑥</m:t>
                       </m:r>
                       <m:r>
-                        <a:rPr lang="en-US" sz="3200" i="1">
+                        <a:rPr lang="en-US" sz="3200" i="1" smtClean="0">
                           <a:latin typeface="Cambria Math" panose="02040503050406030204" pitchFamily="18" charset="0"/>
                         </a:rPr>
                         <m:t>)</m:t>
@@ -7871,7 +7863,7 @@
                             <m:t>α</m:t>
                           </m:r>
                           <m:r>
-                            <a:rPr lang="en-US" sz="3200" baseline="30000">
+                            <a:rPr lang="en-US" sz="3200" b="0" i="0" baseline="30000" smtClean="0">
                               <a:latin typeface="Cambria Math" panose="02040503050406030204" pitchFamily="18" charset="0"/>
                             </a:rPr>
                             <m:t>+</m:t>
@@ -8194,7 +8186,7 @@
             </p:txBody>
           </p:sp>
         </mc:Choice>
-        <mc:Fallback xmlns="">
+        <mc:Fallback>
           <p:sp>
             <p:nvSpPr>
               <p:cNvPr id="7" name="Content Placeholder 2">
@@ -8269,8 +8261,8 @@
           <a:chExt cx="0" cy="0"/>
         </a:xfrm>
       </p:grpSpPr>
-      <mc:AlternateContent xmlns:mc="http://schemas.openxmlformats.org/markup-compatibility/2006" xmlns:a14="http://schemas.microsoft.com/office/drawing/2010/main">
-        <mc:Choice Requires="a14">
+      <mc:AlternateContent xmlns:mc="http://schemas.openxmlformats.org/markup-compatibility/2006">
+        <mc:Choice xmlns:a14="http://schemas.microsoft.com/office/drawing/2010/main" Requires="a14">
           <p:sp>
             <p:nvSpPr>
               <p:cNvPr id="3" name="Content Placeholder 2">
@@ -8468,6 +8460,12 @@
                               </m:r>
                             </m:sub>
                           </m:sSub>
+                          <m:r>
+                            <a:rPr lang="en-US" sz="3200" b="0" i="1" smtClean="0">
+                              <a:latin typeface="Cambria Math" panose="02040503050406030204" pitchFamily="18" charset="0"/>
+                            </a:rPr>
+                            <m:t>)</m:t>
+                          </m:r>
                         </m:e>
                       </m:nary>
                     </m:oMath>
@@ -8478,7 +8476,7 @@
             </p:txBody>
           </p:sp>
         </mc:Choice>
-        <mc:Fallback xmlns="">
+        <mc:Fallback>
           <p:sp>
             <p:nvSpPr>
               <p:cNvPr id="3" name="Content Placeholder 2">
@@ -8577,7 +8575,7 @@
         </p:spPr>
         <p:txBody>
           <a:bodyPr vert="horz" lIns="91440" tIns="45720" rIns="91440" bIns="45720" rtlCol="0" anchor="ctr">
-            <a:normAutofit/>
+            <a:normAutofit fontScale="92500"/>
           </a:bodyPr>
           <a:lstStyle>
             <a:lvl1pPr algn="l" defTabSz="914400" rtl="0" eaLnBrk="1" latinLnBrk="0" hangingPunct="1">
@@ -8601,7 +8599,7 @@
           <a:p>
             <a:r>
               <a:rPr lang="en-US" dirty="0"/>
-              <a:t>Jeffrey’s Equal-Tailed Interval (continued)</a:t>
+              <a:t>Jeffrey’s Prior Bayesian Estimate (continued)</a:t>
             </a:r>
           </a:p>
         </p:txBody>

</xml_diff>